<commit_message>
Linkler,mail için alt bileşenler,pp revize
</commit_message>
<xml_diff>
--- a/WebContent/egitim4/Java EE.pptx
+++ b/WebContent/egitim4/Java EE.pptx
@@ -5,7 +5,7 @@
     <p:sldMasterId id="2147483885" r:id="rId1"/>
   </p:sldMasterIdLst>
   <p:notesMasterIdLst>
-    <p:notesMasterId r:id="rId28"/>
+    <p:notesMasterId r:id="rId30"/>
   </p:notesMasterIdLst>
   <p:sldIdLst>
     <p:sldId id="1176" r:id="rId2"/>
@@ -17,23 +17,25 @@
     <p:sldId id="1181" r:id="rId8"/>
     <p:sldId id="1182" r:id="rId9"/>
     <p:sldId id="1189" r:id="rId10"/>
-    <p:sldId id="1183" r:id="rId11"/>
-    <p:sldId id="1186" r:id="rId12"/>
-    <p:sldId id="1184" r:id="rId13"/>
-    <p:sldId id="1187" r:id="rId14"/>
-    <p:sldId id="1185" r:id="rId15"/>
-    <p:sldId id="1190" r:id="rId16"/>
-    <p:sldId id="1191" r:id="rId17"/>
-    <p:sldId id="1192" r:id="rId18"/>
-    <p:sldId id="1193" r:id="rId19"/>
-    <p:sldId id="1194" r:id="rId20"/>
-    <p:sldId id="1195" r:id="rId21"/>
-    <p:sldId id="1196" r:id="rId22"/>
-    <p:sldId id="1197" r:id="rId23"/>
-    <p:sldId id="1198" r:id="rId24"/>
-    <p:sldId id="1200" r:id="rId25"/>
-    <p:sldId id="1203" r:id="rId26"/>
-    <p:sldId id="1202" r:id="rId27"/>
+    <p:sldId id="1204" r:id="rId11"/>
+    <p:sldId id="1183" r:id="rId12"/>
+    <p:sldId id="1186" r:id="rId13"/>
+    <p:sldId id="1184" r:id="rId14"/>
+    <p:sldId id="1187" r:id="rId15"/>
+    <p:sldId id="1185" r:id="rId16"/>
+    <p:sldId id="1190" r:id="rId17"/>
+    <p:sldId id="1191" r:id="rId18"/>
+    <p:sldId id="1192" r:id="rId19"/>
+    <p:sldId id="1193" r:id="rId20"/>
+    <p:sldId id="1194" r:id="rId21"/>
+    <p:sldId id="1195" r:id="rId22"/>
+    <p:sldId id="1196" r:id="rId23"/>
+    <p:sldId id="1197" r:id="rId24"/>
+    <p:sldId id="1198" r:id="rId25"/>
+    <p:sldId id="1200" r:id="rId26"/>
+    <p:sldId id="1203" r:id="rId27"/>
+    <p:sldId id="1202" r:id="rId28"/>
+    <p:sldId id="1205" r:id="rId29"/>
   </p:sldIdLst>
   <p:sldSz cx="12192000" cy="6858000"/>
   <p:notesSz cx="6858000" cy="9144000"/>
@@ -166,6 +168,7 @@
         </p14:section>
         <p14:section name="Proje Özellikleri" id="{EB5F879E-3762-423C-9B6B-FA5D0A1DC68A}">
           <p14:sldIdLst>
+            <p14:sldId id="1204"/>
             <p14:sldId id="1183"/>
           </p14:sldIdLst>
         </p14:section>
@@ -207,6 +210,7 @@
         <p14:section name="Kriptografi (Simetrik)  (Ekip Arkadaşınızla)" id="{537B69F1-A795-4513-8DC6-EDEDA608F76D}">
           <p14:sldIdLst>
             <p14:sldId id="1202"/>
+            <p14:sldId id="1205"/>
           </p14:sldIdLst>
         </p14:section>
       </p14:sectionLst>
@@ -6719,31 +6723,13 @@
           <a:p>
             <a:r>
               <a:rPr lang="tr-TR" smtClean="0"/>
-              <a:t>Push notification</a:t>
-            </a:r>
-          </a:p>
-          <a:p>
-            <a:r>
-              <a:rPr lang="tr-TR" smtClean="0"/>
-              <a:t>Üyeleri aktif pasif yapabilme</a:t>
-            </a:r>
-          </a:p>
-          <a:p>
-            <a:r>
-              <a:rPr lang="tr-TR" smtClean="0"/>
-              <a:t>Loglama</a:t>
-            </a:r>
-          </a:p>
-          <a:p>
-            <a:r>
-              <a:rPr lang="tr-TR" smtClean="0"/>
-              <a:t>roller ataması(role management)</a:t>
-            </a:r>
-          </a:p>
-          <a:p>
-            <a:r>
-              <a:rPr lang="tr-TR" smtClean="0"/>
-              <a:t>blog yazarken: resim yükleme(image upload) ,yazı yazmak,</a:t>
+              <a:t>Anket projesi</a:t>
+            </a:r>
+          </a:p>
+          <a:p>
+            <a:r>
+              <a:rPr lang="tr-TR" smtClean="0"/>
+              <a:t>Admin soru hazırlayacak buna zaman  verecek.</a:t>
             </a:r>
             <a:endParaRPr lang="tr-TR"/>
           </a:p>
@@ -6821,7 +6807,7 @@
     </p:spTree>
     <p:extLst>
       <p:ext uri="{BB962C8B-B14F-4D97-AF65-F5344CB8AC3E}">
-        <p14:creationId xmlns:p14="http://schemas.microsoft.com/office/powerpoint/2010/main" val="504650828"/>
+        <p14:creationId xmlns:p14="http://schemas.microsoft.com/office/powerpoint/2010/main" val="1675371466"/>
       </p:ext>
     </p:extLst>
   </p:cSld>
@@ -6867,7 +6853,7 @@
           <a:p>
             <a:r>
               <a:rPr lang="tr-TR" smtClean="0"/>
-              <a:t>login/register ekranı</a:t>
+              <a:t>Proje özellikleri</a:t>
             </a:r>
             <a:endParaRPr lang="tr-TR"/>
           </a:p>
@@ -6890,7 +6876,37 @@
           <a:p>
             <a:r>
               <a:rPr lang="tr-TR" smtClean="0"/>
-              <a:t>Login /register ekranı</a:t>
+              <a:t>Mail göndermek(mail send)</a:t>
+            </a:r>
+          </a:p>
+          <a:p>
+            <a:r>
+              <a:rPr lang="tr-TR" smtClean="0"/>
+              <a:t>Push notification</a:t>
+            </a:r>
+          </a:p>
+          <a:p>
+            <a:r>
+              <a:rPr lang="tr-TR" smtClean="0"/>
+              <a:t>Üyeleri aktif pasif yapabilme</a:t>
+            </a:r>
+          </a:p>
+          <a:p>
+            <a:r>
+              <a:rPr lang="tr-TR" smtClean="0"/>
+              <a:t>Loglama</a:t>
+            </a:r>
+          </a:p>
+          <a:p>
+            <a:r>
+              <a:rPr lang="tr-TR" smtClean="0"/>
+              <a:t>roller ataması(role management)</a:t>
+            </a:r>
+          </a:p>
+          <a:p>
+            <a:r>
+              <a:rPr lang="tr-TR" smtClean="0"/>
+              <a:t>blog yazarken: resim yükleme(image upload) ,yazı yazmak,</a:t>
             </a:r>
             <a:endParaRPr lang="tr-TR"/>
           </a:p>
@@ -6968,7 +6984,7 @@
     </p:spTree>
     <p:extLst>
       <p:ext uri="{BB962C8B-B14F-4D97-AF65-F5344CB8AC3E}">
-        <p14:creationId xmlns:p14="http://schemas.microsoft.com/office/powerpoint/2010/main" val="3649035706"/>
+        <p14:creationId xmlns:p14="http://schemas.microsoft.com/office/powerpoint/2010/main" val="504650828"/>
       </p:ext>
     </p:extLst>
   </p:cSld>
@@ -7014,7 +7030,7 @@
           <a:p>
             <a:r>
               <a:rPr lang="tr-TR" smtClean="0"/>
-              <a:t>Blog sayfası</a:t>
+              <a:t>login/register ekranı</a:t>
             </a:r>
             <a:endParaRPr lang="tr-TR"/>
           </a:p>
@@ -7037,20 +7053,7 @@
           <a:p>
             <a:r>
               <a:rPr lang="tr-TR" smtClean="0"/>
-              <a:t>blog header(başlık)</a:t>
-            </a:r>
-          </a:p>
-          <a:p>
-            <a:r>
-              <a:rPr lang="tr-TR" smtClean="0"/>
-              <a:t>blog content (içerik)</a:t>
-            </a:r>
-          </a:p>
-          <a:p>
-            <a:pPr algn="just"/>
-            <a:r>
-              <a:rPr lang="tr-TR" smtClean="0"/>
-              <a:t>blog resim</a:t>
+              <a:t>Login /register ekranı</a:t>
             </a:r>
             <a:endParaRPr lang="tr-TR"/>
           </a:p>
@@ -7128,7 +7131,7 @@
     </p:spTree>
     <p:extLst>
       <p:ext uri="{BB962C8B-B14F-4D97-AF65-F5344CB8AC3E}">
-        <p14:creationId xmlns:p14="http://schemas.microsoft.com/office/powerpoint/2010/main" val="1804141167"/>
+        <p14:creationId xmlns:p14="http://schemas.microsoft.com/office/powerpoint/2010/main" val="3649035706"/>
       </p:ext>
     </p:extLst>
   </p:cSld>
@@ -7174,7 +7177,7 @@
           <a:p>
             <a:r>
               <a:rPr lang="tr-TR" smtClean="0"/>
-              <a:t>Blog Detay sayfası</a:t>
+              <a:t>Blog sayfası</a:t>
             </a:r>
             <a:endParaRPr lang="tr-TR"/>
           </a:p>
@@ -7197,7 +7200,20 @@
           <a:p>
             <a:r>
               <a:rPr lang="tr-TR" smtClean="0"/>
-              <a:t>Her Blog sayfasının  detay sayfası olacak.</a:t>
+              <a:t>blog header(başlık)</a:t>
+            </a:r>
+          </a:p>
+          <a:p>
+            <a:r>
+              <a:rPr lang="tr-TR" smtClean="0"/>
+              <a:t>blog content (içerik)</a:t>
+            </a:r>
+          </a:p>
+          <a:p>
+            <a:pPr algn="just"/>
+            <a:r>
+              <a:rPr lang="tr-TR" smtClean="0"/>
+              <a:t>blog resim</a:t>
             </a:r>
             <a:endParaRPr lang="tr-TR"/>
           </a:p>
@@ -7275,7 +7291,7 @@
     </p:spTree>
     <p:extLst>
       <p:ext uri="{BB962C8B-B14F-4D97-AF65-F5344CB8AC3E}">
-        <p14:creationId xmlns:p14="http://schemas.microsoft.com/office/powerpoint/2010/main" val="3388548592"/>
+        <p14:creationId xmlns:p14="http://schemas.microsoft.com/office/powerpoint/2010/main" val="1804141167"/>
       </p:ext>
     </p:extLst>
   </p:cSld>
@@ -7321,7 +7337,7 @@
           <a:p>
             <a:r>
               <a:rPr lang="tr-TR" smtClean="0"/>
-              <a:t>tag cloud </a:t>
+              <a:t>Blog Detay sayfası</a:t>
             </a:r>
             <a:endParaRPr lang="tr-TR"/>
           </a:p>
@@ -7344,7 +7360,7 @@
           <a:p>
             <a:r>
               <a:rPr lang="tr-TR" smtClean="0"/>
-              <a:t>Bloglardan etiketler oluşturulması ve  tag cloudta gösterilemeli.</a:t>
+              <a:t>Her Blog sayfasının  detay sayfası olacak.</a:t>
             </a:r>
             <a:endParaRPr lang="tr-TR"/>
           </a:p>
@@ -7414,6 +7430,153 @@
             <a:fld id="{F580D79E-702A-4AF5-93EF-BBEB456BD2DD}" type="slidenum">
               <a:rPr lang="tr-TR" smtClean="0"/>
               <a:t>14</a:t>
+            </a:fld>
+            <a:endParaRPr lang="tr-TR"/>
+          </a:p>
+        </p:txBody>
+      </p:sp>
+    </p:spTree>
+    <p:extLst>
+      <p:ext uri="{BB962C8B-B14F-4D97-AF65-F5344CB8AC3E}">
+        <p14:creationId xmlns:p14="http://schemas.microsoft.com/office/powerpoint/2010/main" val="3388548592"/>
+      </p:ext>
+    </p:extLst>
+  </p:cSld>
+  <p:clrMapOvr>
+    <a:masterClrMapping/>
+  </p:clrMapOvr>
+</p:sld>
+</file>
+
+<file path=ppt/slides/slide15.xml><?xml version="1.0" encoding="utf-8"?>
+<p:sld xmlns:a="http://schemas.openxmlformats.org/drawingml/2006/main" xmlns:r="http://schemas.openxmlformats.org/officeDocument/2006/relationships" xmlns:p="http://schemas.openxmlformats.org/presentationml/2006/main">
+  <p:cSld>
+    <p:spTree>
+      <p:nvGrpSpPr>
+        <p:cNvPr id="1" name=""/>
+        <p:cNvGrpSpPr/>
+        <p:nvPr/>
+      </p:nvGrpSpPr>
+      <p:grpSpPr>
+        <a:xfrm>
+          <a:off x="0" y="0"/>
+          <a:ext cx="0" cy="0"/>
+          <a:chOff x="0" y="0"/>
+          <a:chExt cx="0" cy="0"/>
+        </a:xfrm>
+      </p:grpSpPr>
+      <p:sp>
+        <p:nvSpPr>
+          <p:cNvPr id="2" name="Unvan 1"/>
+          <p:cNvSpPr>
+            <a:spLocks noGrp="1"/>
+          </p:cNvSpPr>
+          <p:nvPr>
+            <p:ph type="title"/>
+          </p:nvPr>
+        </p:nvSpPr>
+        <p:spPr/>
+        <p:txBody>
+          <a:bodyPr>
+            <a:normAutofit fontScale="90000"/>
+          </a:bodyPr>
+          <a:lstStyle/>
+          <a:p>
+            <a:r>
+              <a:rPr lang="tr-TR" smtClean="0"/>
+              <a:t>tag cloud </a:t>
+            </a:r>
+            <a:endParaRPr lang="tr-TR"/>
+          </a:p>
+        </p:txBody>
+      </p:sp>
+      <p:sp>
+        <p:nvSpPr>
+          <p:cNvPr id="3" name="İçerik Yer Tutucusu 2"/>
+          <p:cNvSpPr>
+            <a:spLocks noGrp="1"/>
+          </p:cNvSpPr>
+          <p:nvPr>
+            <p:ph idx="1"/>
+          </p:nvPr>
+        </p:nvSpPr>
+        <p:spPr/>
+        <p:txBody>
+          <a:bodyPr/>
+          <a:lstStyle/>
+          <a:p>
+            <a:r>
+              <a:rPr lang="tr-TR" smtClean="0"/>
+              <a:t>Bloglardan etiketler oluşturulması ve  tag cloudta gösterilemeli.</a:t>
+            </a:r>
+            <a:endParaRPr lang="tr-TR"/>
+          </a:p>
+        </p:txBody>
+      </p:sp>
+      <p:sp>
+        <p:nvSpPr>
+          <p:cNvPr id="4" name="Veri Yer Tutucusu 3"/>
+          <p:cNvSpPr>
+            <a:spLocks noGrp="1"/>
+          </p:cNvSpPr>
+          <p:nvPr>
+            <p:ph type="dt" sz="half" idx="10"/>
+          </p:nvPr>
+        </p:nvSpPr>
+        <p:spPr/>
+        <p:txBody>
+          <a:bodyPr/>
+          <a:lstStyle/>
+          <a:p>
+            <a:fld id="{AA833C2E-F721-4D16-A208-27426F60C2E0}" type="datetime1">
+              <a:rPr lang="tr-TR" smtClean="0"/>
+              <a:t>5.07.2021</a:t>
+            </a:fld>
+            <a:endParaRPr lang="tr-TR"/>
+          </a:p>
+        </p:txBody>
+      </p:sp>
+      <p:sp>
+        <p:nvSpPr>
+          <p:cNvPr id="5" name="Altbilgi Yer Tutucusu 4"/>
+          <p:cNvSpPr>
+            <a:spLocks noGrp="1"/>
+          </p:cNvSpPr>
+          <p:nvPr>
+            <p:ph type="ftr" sz="quarter" idx="11"/>
+          </p:nvPr>
+        </p:nvSpPr>
+        <p:spPr/>
+        <p:txBody>
+          <a:bodyPr/>
+          <a:lstStyle/>
+          <a:p>
+            <a:r>
+              <a:rPr lang="tr-TR" smtClean="0"/>
+              <a:t>JAVA FULL STACK DEVELOPER HAMİT MIZRAK</a:t>
+            </a:r>
+            <a:endParaRPr lang="tr-TR"/>
+          </a:p>
+        </p:txBody>
+      </p:sp>
+      <p:sp>
+        <p:nvSpPr>
+          <p:cNvPr id="6" name="Slayt Numarası Yer Tutucusu 5"/>
+          <p:cNvSpPr>
+            <a:spLocks noGrp="1"/>
+          </p:cNvSpPr>
+          <p:nvPr>
+            <p:ph type="sldNum" sz="quarter" idx="12"/>
+          </p:nvPr>
+        </p:nvSpPr>
+        <p:spPr/>
+        <p:txBody>
+          <a:bodyPr/>
+          <a:lstStyle/>
+          <a:p>
+            <a:fld id="{F580D79E-702A-4AF5-93EF-BBEB456BD2DD}" type="slidenum">
+              <a:rPr lang="tr-TR" smtClean="0"/>
+              <a:t>15</a:t>
             </a:fld>
             <a:endParaRPr lang="tr-TR"/>
           </a:p>
@@ -7462,153 +7625,6 @@
 </p:sld>
 </file>
 
-<file path=ppt/slides/slide15.xml><?xml version="1.0" encoding="utf-8"?>
-<p:sld xmlns:a="http://schemas.openxmlformats.org/drawingml/2006/main" xmlns:r="http://schemas.openxmlformats.org/officeDocument/2006/relationships" xmlns:p="http://schemas.openxmlformats.org/presentationml/2006/main">
-  <p:cSld>
-    <p:spTree>
-      <p:nvGrpSpPr>
-        <p:cNvPr id="1" name=""/>
-        <p:cNvGrpSpPr/>
-        <p:nvPr/>
-      </p:nvGrpSpPr>
-      <p:grpSpPr>
-        <a:xfrm>
-          <a:off x="0" y="0"/>
-          <a:ext cx="0" cy="0"/>
-          <a:chOff x="0" y="0"/>
-          <a:chExt cx="0" cy="0"/>
-        </a:xfrm>
-      </p:grpSpPr>
-      <p:sp>
-        <p:nvSpPr>
-          <p:cNvPr id="2" name="Unvan 1"/>
-          <p:cNvSpPr>
-            <a:spLocks noGrp="1"/>
-          </p:cNvSpPr>
-          <p:nvPr>
-            <p:ph type="title"/>
-          </p:nvPr>
-        </p:nvSpPr>
-        <p:spPr/>
-        <p:txBody>
-          <a:bodyPr>
-            <a:normAutofit fontScale="90000"/>
-          </a:bodyPr>
-          <a:lstStyle/>
-          <a:p>
-            <a:r>
-              <a:rPr lang="tr-TR" smtClean="0"/>
-              <a:t>En son ziyaret edilen sayfa</a:t>
-            </a:r>
-            <a:endParaRPr lang="tr-TR"/>
-          </a:p>
-        </p:txBody>
-      </p:sp>
-      <p:sp>
-        <p:nvSpPr>
-          <p:cNvPr id="3" name="İçerik Yer Tutucusu 2"/>
-          <p:cNvSpPr>
-            <a:spLocks noGrp="1"/>
-          </p:cNvSpPr>
-          <p:nvPr>
-            <p:ph idx="1"/>
-          </p:nvPr>
-        </p:nvSpPr>
-        <p:spPr/>
-        <p:txBody>
-          <a:bodyPr/>
-          <a:lstStyle/>
-          <a:p>
-            <a:r>
-              <a:rPr lang="tr-TR" smtClean="0"/>
-              <a:t>En çok ziyaret edilen blog sayfasınını yapılması</a:t>
-            </a:r>
-            <a:endParaRPr lang="tr-TR"/>
-          </a:p>
-        </p:txBody>
-      </p:sp>
-      <p:sp>
-        <p:nvSpPr>
-          <p:cNvPr id="4" name="Veri Yer Tutucusu 3"/>
-          <p:cNvSpPr>
-            <a:spLocks noGrp="1"/>
-          </p:cNvSpPr>
-          <p:nvPr>
-            <p:ph type="dt" sz="half" idx="10"/>
-          </p:nvPr>
-        </p:nvSpPr>
-        <p:spPr/>
-        <p:txBody>
-          <a:bodyPr/>
-          <a:lstStyle/>
-          <a:p>
-            <a:fld id="{AA833C2E-F721-4D16-A208-27426F60C2E0}" type="datetime1">
-              <a:rPr lang="tr-TR" smtClean="0"/>
-              <a:t>5.07.2021</a:t>
-            </a:fld>
-            <a:endParaRPr lang="tr-TR"/>
-          </a:p>
-        </p:txBody>
-      </p:sp>
-      <p:sp>
-        <p:nvSpPr>
-          <p:cNvPr id="5" name="Altbilgi Yer Tutucusu 4"/>
-          <p:cNvSpPr>
-            <a:spLocks noGrp="1"/>
-          </p:cNvSpPr>
-          <p:nvPr>
-            <p:ph type="ftr" sz="quarter" idx="11"/>
-          </p:nvPr>
-        </p:nvSpPr>
-        <p:spPr/>
-        <p:txBody>
-          <a:bodyPr/>
-          <a:lstStyle/>
-          <a:p>
-            <a:r>
-              <a:rPr lang="tr-TR" smtClean="0"/>
-              <a:t>JAVA FULL STACK DEVELOPER HAMİT MIZRAK</a:t>
-            </a:r>
-            <a:endParaRPr lang="tr-TR"/>
-          </a:p>
-        </p:txBody>
-      </p:sp>
-      <p:sp>
-        <p:nvSpPr>
-          <p:cNvPr id="6" name="Slayt Numarası Yer Tutucusu 5"/>
-          <p:cNvSpPr>
-            <a:spLocks noGrp="1"/>
-          </p:cNvSpPr>
-          <p:nvPr>
-            <p:ph type="sldNum" sz="quarter" idx="12"/>
-          </p:nvPr>
-        </p:nvSpPr>
-        <p:spPr/>
-        <p:txBody>
-          <a:bodyPr/>
-          <a:lstStyle/>
-          <a:p>
-            <a:fld id="{F580D79E-702A-4AF5-93EF-BBEB456BD2DD}" type="slidenum">
-              <a:rPr lang="tr-TR" smtClean="0"/>
-              <a:t>15</a:t>
-            </a:fld>
-            <a:endParaRPr lang="tr-TR"/>
-          </a:p>
-        </p:txBody>
-      </p:sp>
-    </p:spTree>
-    <p:extLst>
-      <p:ext uri="{BB962C8B-B14F-4D97-AF65-F5344CB8AC3E}">
-        <p14:creationId xmlns:p14="http://schemas.microsoft.com/office/powerpoint/2010/main" val="992184980"/>
-      </p:ext>
-    </p:extLst>
-  </p:cSld>
-  <p:clrMapOvr>
-    <a:masterClrMapping/>
-  </p:clrMapOvr>
-</p:sld>
-</file>
-
 <file path=ppt/slides/slide16.xml><?xml version="1.0" encoding="utf-8"?>
 <p:sld xmlns:a="http://schemas.openxmlformats.org/drawingml/2006/main" xmlns:r="http://schemas.openxmlformats.org/officeDocument/2006/relationships" xmlns:p="http://schemas.openxmlformats.org/presentationml/2006/main">
   <p:cSld>
@@ -7645,7 +7661,7 @@
           <a:p>
             <a:r>
               <a:rPr lang="tr-TR" smtClean="0"/>
-              <a:t>En çok okunan Blog sayfası</a:t>
+              <a:t>En son ziyaret edilen sayfa</a:t>
             </a:r>
             <a:endParaRPr lang="tr-TR"/>
           </a:p>
@@ -7668,7 +7684,7 @@
           <a:p>
             <a:r>
               <a:rPr lang="tr-TR" smtClean="0"/>
-              <a:t>En çok okunan blog sayfasından 5 tanesi gösterilmeli</a:t>
+              <a:t>En çok ziyaret edilen blog sayfasınını yapılması</a:t>
             </a:r>
             <a:endParaRPr lang="tr-TR"/>
           </a:p>
@@ -7746,7 +7762,7 @@
     </p:spTree>
     <p:extLst>
       <p:ext uri="{BB962C8B-B14F-4D97-AF65-F5344CB8AC3E}">
-        <p14:creationId xmlns:p14="http://schemas.microsoft.com/office/powerpoint/2010/main" val="3941454674"/>
+        <p14:creationId xmlns:p14="http://schemas.microsoft.com/office/powerpoint/2010/main" val="992184980"/>
       </p:ext>
     </p:extLst>
   </p:cSld>
@@ -7792,7 +7808,7 @@
           <a:p>
             <a:r>
               <a:rPr lang="tr-TR" smtClean="0"/>
-              <a:t>Push Notification</a:t>
+              <a:t>En çok okunan Blog sayfası</a:t>
             </a:r>
             <a:endParaRPr lang="tr-TR"/>
           </a:p>
@@ -7815,7 +7831,7 @@
           <a:p>
             <a:r>
               <a:rPr lang="tr-TR" smtClean="0"/>
-              <a:t>admin bütün kullanılıları bildirimde bulunması için push notification yapmalı</a:t>
+              <a:t>En çok okunan blog sayfasından 5 tanesi gösterilmeli</a:t>
             </a:r>
             <a:endParaRPr lang="tr-TR"/>
           </a:p>
@@ -7893,7 +7909,7 @@
     </p:spTree>
     <p:extLst>
       <p:ext uri="{BB962C8B-B14F-4D97-AF65-F5344CB8AC3E}">
-        <p14:creationId xmlns:p14="http://schemas.microsoft.com/office/powerpoint/2010/main" val="2651640345"/>
+        <p14:creationId xmlns:p14="http://schemas.microsoft.com/office/powerpoint/2010/main" val="3941454674"/>
       </p:ext>
     </p:extLst>
   </p:cSld>
@@ -7939,7 +7955,7 @@
           <a:p>
             <a:r>
               <a:rPr lang="tr-TR" smtClean="0"/>
-              <a:t>Creational Design Patterns</a:t>
+              <a:t>Push Notification</a:t>
             </a:r>
             <a:endParaRPr lang="tr-TR"/>
           </a:p>
@@ -7962,37 +7978,7 @@
           <a:p>
             <a:r>
               <a:rPr lang="tr-TR" smtClean="0"/>
-              <a:t>Abstract Factory</a:t>
-            </a:r>
-          </a:p>
-          <a:p>
-            <a:r>
-              <a:rPr lang="tr-TR" smtClean="0"/>
-              <a:t>builder</a:t>
-            </a:r>
-          </a:p>
-          <a:p>
-            <a:r>
-              <a:rPr lang="tr-TR" smtClean="0"/>
-              <a:t>Factory Method</a:t>
-            </a:r>
-          </a:p>
-          <a:p>
-            <a:r>
-              <a:rPr lang="tr-TR" smtClean="0"/>
-              <a:t>Object Pool</a:t>
-            </a:r>
-          </a:p>
-          <a:p>
-            <a:r>
-              <a:rPr lang="tr-TR" smtClean="0"/>
-              <a:t>Prototype</a:t>
-            </a:r>
-          </a:p>
-          <a:p>
-            <a:r>
-              <a:rPr lang="tr-TR" smtClean="0"/>
-              <a:t>Singleton</a:t>
+              <a:t>admin bütün kullanılıları bildirimde bulunması için push notification yapmalı</a:t>
             </a:r>
             <a:endParaRPr lang="tr-TR"/>
           </a:p>
@@ -8070,7 +8056,7 @@
     </p:spTree>
     <p:extLst>
       <p:ext uri="{BB962C8B-B14F-4D97-AF65-F5344CB8AC3E}">
-        <p14:creationId xmlns:p14="http://schemas.microsoft.com/office/powerpoint/2010/main" val="3523667408"/>
+        <p14:creationId xmlns:p14="http://schemas.microsoft.com/office/powerpoint/2010/main" val="2651640345"/>
       </p:ext>
     </p:extLst>
   </p:cSld>
@@ -8116,7 +8102,7 @@
           <a:p>
             <a:r>
               <a:rPr lang="tr-TR" smtClean="0"/>
-              <a:t>SOLID</a:t>
+              <a:t>Creational Design Patterns</a:t>
             </a:r>
             <a:endParaRPr lang="tr-TR"/>
           </a:p>
@@ -8137,7 +8123,56 @@
           <a:bodyPr/>
           <a:lstStyle/>
           <a:p>
-            <a:endParaRPr lang="tr-TR"/>
+            <a:r>
+              <a:rPr lang="tr-TR" smtClean="0"/>
+              <a:t>Prototype </a:t>
+            </a:r>
+          </a:p>
+          <a:p>
+            <a:r>
+              <a:rPr lang="tr-TR" smtClean="0"/>
+              <a:t>Singleton </a:t>
+            </a:r>
+          </a:p>
+          <a:p>
+            <a:r>
+              <a:rPr lang="tr-TR"/>
+              <a:t>builder</a:t>
+            </a:r>
+          </a:p>
+          <a:p>
+            <a:pPr marL="0" indent="0">
+              <a:buNone/>
+            </a:pPr>
+            <a:endParaRPr lang="tr-TR" smtClean="0"/>
+          </a:p>
+          <a:p>
+            <a:r>
+              <a:rPr lang="tr-TR" smtClean="0"/>
+              <a:t>Abstract </a:t>
+            </a:r>
+            <a:r>
+              <a:rPr lang="tr-TR" smtClean="0"/>
+              <a:t>Factory</a:t>
+            </a:r>
+          </a:p>
+          <a:p>
+            <a:r>
+              <a:rPr lang="tr-TR" smtClean="0"/>
+              <a:t>Factory Method</a:t>
+            </a:r>
+            <a:endParaRPr lang="tr-TR" smtClean="0"/>
+          </a:p>
+          <a:p>
+            <a:r>
+              <a:rPr lang="tr-TR" smtClean="0"/>
+              <a:t>Object </a:t>
+            </a:r>
+            <a:r>
+              <a:rPr lang="tr-TR" smtClean="0"/>
+              <a:t>Pool</a:t>
+            </a:r>
+            <a:endParaRPr lang="tr-TR" smtClean="0"/>
           </a:p>
         </p:txBody>
       </p:sp>
@@ -8213,7 +8248,7 @@
     </p:spTree>
     <p:extLst>
       <p:ext uri="{BB962C8B-B14F-4D97-AF65-F5344CB8AC3E}">
-        <p14:creationId xmlns:p14="http://schemas.microsoft.com/office/powerpoint/2010/main" val="2552050334"/>
+        <p14:creationId xmlns:p14="http://schemas.microsoft.com/office/powerpoint/2010/main" val="3523667408"/>
       </p:ext>
     </p:extLst>
   </p:cSld>
@@ -8299,13 +8334,26 @@
           <a:p>
             <a:r>
               <a:rPr lang="tr-TR" smtClean="0"/>
-              <a:t>GitHub Linki</a:t>
-            </a:r>
-          </a:p>
-          <a:p>
-            <a:r>
-              <a:rPr lang="tr-TR" smtClean="0"/>
-              <a:t>örneğin: Bilgisayar Müh. Hamit Mızrak  hamitmizrak@gmail.com</a:t>
+              <a:t>GitHub </a:t>
+            </a:r>
+            <a:r>
+              <a:rPr lang="tr-TR" smtClean="0"/>
+              <a:t>Linki </a:t>
+            </a:r>
+            <a:endParaRPr lang="tr-TR" smtClean="0"/>
+          </a:p>
+          <a:p>
+            <a:r>
+              <a:rPr lang="tr-TR" smtClean="0"/>
+              <a:t>örneğin</a:t>
+            </a:r>
+            <a:r>
+              <a:rPr lang="tr-TR" smtClean="0"/>
+              <a:t>: JavaEE1 </a:t>
+            </a:r>
+            <a:r>
+              <a:rPr lang="tr-TR" smtClean="0"/>
+              <a:t>Bilgisayar Müh. Hamit Mızrak  hamitmizrak@gmail.com</a:t>
             </a:r>
           </a:p>
           <a:p>
@@ -8446,12 +8494,8 @@
           <a:lstStyle/>
           <a:p>
             <a:r>
-              <a:rPr lang="tr-TR" u="sng">
-                <a:solidFill>
-                  <a:srgbClr val="FFFF00"/>
-                </a:solidFill>
-              </a:rPr>
-              <a:t>DRY – Don’t Repeat Yourself</a:t>
+              <a:rPr lang="tr-TR" smtClean="0"/>
+              <a:t>SOLID</a:t>
             </a:r>
             <a:endParaRPr lang="tr-TR"/>
           </a:p>
@@ -8472,6 +8516,34 @@
           <a:bodyPr/>
           <a:lstStyle/>
           <a:p>
+            <a:r>
+              <a:rPr lang="tr-TR" smtClean="0"/>
+              <a:t>S</a:t>
+            </a:r>
+          </a:p>
+          <a:p>
+            <a:r>
+              <a:rPr lang="tr-TR" smtClean="0"/>
+              <a:t>O</a:t>
+            </a:r>
+          </a:p>
+          <a:p>
+            <a:r>
+              <a:rPr lang="tr-TR" smtClean="0"/>
+              <a:t>L</a:t>
+            </a:r>
+          </a:p>
+          <a:p>
+            <a:r>
+              <a:rPr lang="tr-TR" smtClean="0"/>
+              <a:t>I</a:t>
+            </a:r>
+          </a:p>
+          <a:p>
+            <a:r>
+              <a:rPr lang="tr-TR"/>
+              <a:t>D</a:t>
+            </a:r>
             <a:endParaRPr lang="tr-TR"/>
           </a:p>
         </p:txBody>
@@ -8548,7 +8620,7 @@
     </p:spTree>
     <p:extLst>
       <p:ext uri="{BB962C8B-B14F-4D97-AF65-F5344CB8AC3E}">
-        <p14:creationId xmlns:p14="http://schemas.microsoft.com/office/powerpoint/2010/main" val="2141845946"/>
+        <p14:creationId xmlns:p14="http://schemas.microsoft.com/office/powerpoint/2010/main" val="2552050334"/>
       </p:ext>
     </p:extLst>
   </p:cSld>
@@ -8598,7 +8670,7 @@
                   <a:srgbClr val="FFFF00"/>
                 </a:solidFill>
               </a:rPr>
-              <a:t>REP – Reuse - Release Equivalence Principle</a:t>
+              <a:t>DRY – Don’t Repeat Yourself</a:t>
             </a:r>
             <a:endParaRPr lang="tr-TR"/>
           </a:p>
@@ -8695,7 +8767,7 @@
     </p:spTree>
     <p:extLst>
       <p:ext uri="{BB962C8B-B14F-4D97-AF65-F5344CB8AC3E}">
-        <p14:creationId xmlns:p14="http://schemas.microsoft.com/office/powerpoint/2010/main" val="647573113"/>
+        <p14:creationId xmlns:p14="http://schemas.microsoft.com/office/powerpoint/2010/main" val="2141845946"/>
       </p:ext>
     </p:extLst>
   </p:cSld>
@@ -8745,7 +8817,7 @@
                   <a:srgbClr val="FFFF00"/>
                 </a:solidFill>
               </a:rPr>
-              <a:t>CCP – Common Closure Principle</a:t>
+              <a:t>REP – Reuse - Release Equivalence Principle</a:t>
             </a:r>
             <a:endParaRPr lang="tr-TR"/>
           </a:p>
@@ -8842,7 +8914,7 @@
     </p:spTree>
     <p:extLst>
       <p:ext uri="{BB962C8B-B14F-4D97-AF65-F5344CB8AC3E}">
-        <p14:creationId xmlns:p14="http://schemas.microsoft.com/office/powerpoint/2010/main" val="493421008"/>
+        <p14:creationId xmlns:p14="http://schemas.microsoft.com/office/powerpoint/2010/main" val="647573113"/>
       </p:ext>
     </p:extLst>
   </p:cSld>
@@ -8887,8 +8959,12 @@
           <a:lstStyle/>
           <a:p>
             <a:r>
-              <a:rPr lang="tr-TR" smtClean="0"/>
-              <a:t>Yangi</a:t>
+              <a:rPr lang="tr-TR" u="sng">
+                <a:solidFill>
+                  <a:srgbClr val="FFFF00"/>
+                </a:solidFill>
+              </a:rPr>
+              <a:t>CCP – Common Closure Principle</a:t>
             </a:r>
             <a:endParaRPr lang="tr-TR"/>
           </a:p>
@@ -8985,7 +9061,7 @@
     </p:spTree>
     <p:extLst>
       <p:ext uri="{BB962C8B-B14F-4D97-AF65-F5344CB8AC3E}">
-        <p14:creationId xmlns:p14="http://schemas.microsoft.com/office/powerpoint/2010/main" val="3666746500"/>
+        <p14:creationId xmlns:p14="http://schemas.microsoft.com/office/powerpoint/2010/main" val="493421008"/>
       </p:ext>
     </p:extLst>
   </p:cSld>
@@ -9031,7 +9107,7 @@
           <a:p>
             <a:r>
               <a:rPr lang="tr-TR" smtClean="0"/>
-              <a:t>Araştırma Ödevleri</a:t>
+              <a:t>Yangi</a:t>
             </a:r>
             <a:endParaRPr lang="tr-TR"/>
           </a:p>
@@ -9052,28 +9128,6 @@
           <a:bodyPr/>
           <a:lstStyle/>
           <a:p>
-            <a:r>
-              <a:rPr lang="tr-TR" smtClean="0"/>
-              <a:t>Agile</a:t>
-            </a:r>
-          </a:p>
-          <a:p>
-            <a:r>
-              <a:rPr lang="tr-TR" smtClean="0"/>
-              <a:t>Scrum</a:t>
-            </a:r>
-          </a:p>
-          <a:p>
-            <a:r>
-              <a:rPr lang="tr-TR" smtClean="0"/>
-              <a:t>Mvc</a:t>
-            </a:r>
-          </a:p>
-          <a:p>
-            <a:r>
-              <a:rPr lang="tr-TR" smtClean="0"/>
-              <a:t>Şifreleme Yöntemleri (Kriptolografi)</a:t>
-            </a:r>
             <a:endParaRPr lang="tr-TR"/>
           </a:p>
         </p:txBody>
@@ -9150,7 +9204,7 @@
     </p:spTree>
     <p:extLst>
       <p:ext uri="{BB962C8B-B14F-4D97-AF65-F5344CB8AC3E}">
-        <p14:creationId xmlns:p14="http://schemas.microsoft.com/office/powerpoint/2010/main" val="2098647455"/>
+        <p14:creationId xmlns:p14="http://schemas.microsoft.com/office/powerpoint/2010/main" val="3666746500"/>
       </p:ext>
     </p:extLst>
   </p:cSld>
@@ -9195,16 +9249,8 @@
           <a:lstStyle/>
           <a:p>
             <a:r>
-              <a:rPr lang="sv-SE"/>
-              <a:t>Yazılımda en çok kullanılan </a:t>
-            </a:r>
-            <a:r>
-              <a:rPr lang="sv-SE" smtClean="0"/>
-              <a:t>terimler</a:t>
-            </a:r>
-            <a:r>
-              <a:rPr lang="tr-TR" smtClean="0"/>
-              <a:t> (70)</a:t>
+              <a:rPr lang="tr-TR" smtClean="0"/>
+              <a:t>Araştırma Ödevleri</a:t>
             </a:r>
             <a:endParaRPr lang="tr-TR"/>
           </a:p>
@@ -9227,19 +9273,35 @@
           <a:p>
             <a:r>
               <a:rPr lang="tr-TR" smtClean="0"/>
-              <a:t>delete=silmek</a:t>
-            </a:r>
-          </a:p>
-          <a:p>
-            <a:r>
-              <a:rPr lang="tr-TR" smtClean="0"/>
-              <a:t>create=oluşturmak</a:t>
-            </a:r>
-          </a:p>
-          <a:p>
-            <a:r>
-              <a:rPr lang="tr-TR" smtClean="0"/>
-              <a:t>subkategori=alt kategori</a:t>
+              <a:t>Agile</a:t>
+            </a:r>
+          </a:p>
+          <a:p>
+            <a:r>
+              <a:rPr lang="tr-TR" smtClean="0"/>
+              <a:t>Scrum</a:t>
+            </a:r>
+          </a:p>
+          <a:p>
+            <a:r>
+              <a:rPr lang="tr-TR" smtClean="0"/>
+              <a:t>Mvc</a:t>
+            </a:r>
+          </a:p>
+          <a:p>
+            <a:r>
+              <a:rPr lang="tr-TR" smtClean="0"/>
+              <a:t>Şifreleme Yöntemleri (</a:t>
+            </a:r>
+            <a:r>
+              <a:rPr lang="tr-TR" smtClean="0"/>
+              <a:t>Kriptografi) </a:t>
+            </a:r>
+            <a:r>
+              <a:rPr lang="tr-TR" smtClean="0">
+                <a:sym typeface="Wingdings" panose="05000000000000000000" pitchFamily="2" charset="2"/>
+              </a:rPr>
+              <a:t> Base64.Decoder-Encoder , MD5</a:t>
             </a:r>
             <a:endParaRPr lang="tr-TR"/>
           </a:p>
@@ -9317,7 +9379,7 @@
     </p:spTree>
     <p:extLst>
       <p:ext uri="{BB962C8B-B14F-4D97-AF65-F5344CB8AC3E}">
-        <p14:creationId xmlns:p14="http://schemas.microsoft.com/office/powerpoint/2010/main" val="586794375"/>
+        <p14:creationId xmlns:p14="http://schemas.microsoft.com/office/powerpoint/2010/main" val="2098647455"/>
       </p:ext>
     </p:extLst>
   </p:cSld>
@@ -9362,6 +9424,199 @@
           <a:lstStyle/>
           <a:p>
             <a:r>
+              <a:rPr lang="sv-SE"/>
+              <a:t>Yazılımda en çok kullanılan </a:t>
+            </a:r>
+            <a:r>
+              <a:rPr lang="sv-SE" smtClean="0"/>
+              <a:t>terimler</a:t>
+            </a:r>
+            <a:r>
+              <a:rPr lang="tr-TR" smtClean="0"/>
+              <a:t> (</a:t>
+            </a:r>
+            <a:r>
+              <a:rPr lang="tr-TR" smtClean="0"/>
+              <a:t>75)</a:t>
+            </a:r>
+            <a:endParaRPr lang="tr-TR"/>
+          </a:p>
+        </p:txBody>
+      </p:sp>
+      <p:sp>
+        <p:nvSpPr>
+          <p:cNvPr id="3" name="İçerik Yer Tutucusu 2"/>
+          <p:cNvSpPr>
+            <a:spLocks noGrp="1"/>
+          </p:cNvSpPr>
+          <p:nvPr>
+            <p:ph idx="1"/>
+          </p:nvPr>
+        </p:nvSpPr>
+        <p:spPr/>
+        <p:txBody>
+          <a:bodyPr/>
+          <a:lstStyle/>
+          <a:p>
+            <a:r>
+              <a:rPr lang="tr-TR" smtClean="0"/>
+              <a:t>delete=silmek</a:t>
+            </a:r>
+          </a:p>
+          <a:p>
+            <a:r>
+              <a:rPr lang="tr-TR" smtClean="0"/>
+              <a:t>create=oluşturmak</a:t>
+            </a:r>
+          </a:p>
+          <a:p>
+            <a:r>
+              <a:rPr lang="tr-TR" smtClean="0"/>
+              <a:t>subkategori=alt </a:t>
+            </a:r>
+            <a:r>
+              <a:rPr lang="tr-TR" smtClean="0"/>
+              <a:t>kategori</a:t>
+            </a:r>
+          </a:p>
+          <a:p>
+            <a:r>
+              <a:rPr lang="tr-TR" smtClean="0"/>
+              <a:t>deployment</a:t>
+            </a:r>
+          </a:p>
+          <a:p>
+            <a:r>
+              <a:rPr lang="tr-TR" smtClean="0"/>
+              <a:t>render</a:t>
+            </a:r>
+          </a:p>
+          <a:p>
+            <a:r>
+              <a:rPr lang="tr-TR" smtClean="0"/>
+              <a:t>best practi…</a:t>
+            </a:r>
+            <a:endParaRPr lang="tr-TR"/>
+          </a:p>
+        </p:txBody>
+      </p:sp>
+      <p:sp>
+        <p:nvSpPr>
+          <p:cNvPr id="4" name="Veri Yer Tutucusu 3"/>
+          <p:cNvSpPr>
+            <a:spLocks noGrp="1"/>
+          </p:cNvSpPr>
+          <p:nvPr>
+            <p:ph type="dt" sz="half" idx="10"/>
+          </p:nvPr>
+        </p:nvSpPr>
+        <p:spPr/>
+        <p:txBody>
+          <a:bodyPr/>
+          <a:lstStyle/>
+          <a:p>
+            <a:fld id="{AA833C2E-F721-4D16-A208-27426F60C2E0}" type="datetime1">
+              <a:rPr lang="tr-TR" smtClean="0"/>
+              <a:t>5.07.2021</a:t>
+            </a:fld>
+            <a:endParaRPr lang="tr-TR"/>
+          </a:p>
+        </p:txBody>
+      </p:sp>
+      <p:sp>
+        <p:nvSpPr>
+          <p:cNvPr id="5" name="Altbilgi Yer Tutucusu 4"/>
+          <p:cNvSpPr>
+            <a:spLocks noGrp="1"/>
+          </p:cNvSpPr>
+          <p:nvPr>
+            <p:ph type="ftr" sz="quarter" idx="11"/>
+          </p:nvPr>
+        </p:nvSpPr>
+        <p:spPr/>
+        <p:txBody>
+          <a:bodyPr/>
+          <a:lstStyle/>
+          <a:p>
+            <a:r>
+              <a:rPr lang="tr-TR" smtClean="0"/>
+              <a:t>JAVA FULL STACK DEVELOPER HAMİT MIZRAK</a:t>
+            </a:r>
+            <a:endParaRPr lang="tr-TR"/>
+          </a:p>
+        </p:txBody>
+      </p:sp>
+      <p:sp>
+        <p:nvSpPr>
+          <p:cNvPr id="6" name="Slayt Numarası Yer Tutucusu 5"/>
+          <p:cNvSpPr>
+            <a:spLocks noGrp="1"/>
+          </p:cNvSpPr>
+          <p:nvPr>
+            <p:ph type="sldNum" sz="quarter" idx="12"/>
+          </p:nvPr>
+        </p:nvSpPr>
+        <p:spPr/>
+        <p:txBody>
+          <a:bodyPr/>
+          <a:lstStyle/>
+          <a:p>
+            <a:fld id="{F580D79E-702A-4AF5-93EF-BBEB456BD2DD}" type="slidenum">
+              <a:rPr lang="tr-TR" smtClean="0"/>
+              <a:t>26</a:t>
+            </a:fld>
+            <a:endParaRPr lang="tr-TR"/>
+          </a:p>
+        </p:txBody>
+      </p:sp>
+    </p:spTree>
+    <p:extLst>
+      <p:ext uri="{BB962C8B-B14F-4D97-AF65-F5344CB8AC3E}">
+        <p14:creationId xmlns:p14="http://schemas.microsoft.com/office/powerpoint/2010/main" val="586794375"/>
+      </p:ext>
+    </p:extLst>
+  </p:cSld>
+  <p:clrMapOvr>
+    <a:masterClrMapping/>
+  </p:clrMapOvr>
+</p:sld>
+</file>
+
+<file path=ppt/slides/slide27.xml><?xml version="1.0" encoding="utf-8"?>
+<p:sld xmlns:a="http://schemas.openxmlformats.org/drawingml/2006/main" xmlns:r="http://schemas.openxmlformats.org/officeDocument/2006/relationships" xmlns:p="http://schemas.openxmlformats.org/presentationml/2006/main">
+  <p:cSld>
+    <p:spTree>
+      <p:nvGrpSpPr>
+        <p:cNvPr id="1" name=""/>
+        <p:cNvGrpSpPr/>
+        <p:nvPr/>
+      </p:nvGrpSpPr>
+      <p:grpSpPr>
+        <a:xfrm>
+          <a:off x="0" y="0"/>
+          <a:ext cx="0" cy="0"/>
+          <a:chOff x="0" y="0"/>
+          <a:chExt cx="0" cy="0"/>
+        </a:xfrm>
+      </p:grpSpPr>
+      <p:sp>
+        <p:nvSpPr>
+          <p:cNvPr id="2" name="Unvan 1"/>
+          <p:cNvSpPr>
+            <a:spLocks noGrp="1"/>
+          </p:cNvSpPr>
+          <p:nvPr>
+            <p:ph type="title"/>
+          </p:nvPr>
+        </p:nvSpPr>
+        <p:spPr/>
+        <p:txBody>
+          <a:bodyPr>
+            <a:normAutofit fontScale="90000"/>
+          </a:bodyPr>
+          <a:lstStyle/>
+          <a:p>
+            <a:r>
               <a:rPr lang="tr-TR"/>
               <a:t>Simetrik  Şifreleme Algoritması</a:t>
             </a:r>
@@ -9521,7 +9776,7 @@
           <a:p>
             <a:fld id="{F580D79E-702A-4AF5-93EF-BBEB456BD2DD}" type="slidenum">
               <a:rPr lang="tr-TR" smtClean="0"/>
-              <a:t>26</a:t>
+              <a:t>27</a:t>
             </a:fld>
             <a:endParaRPr lang="tr-TR"/>
           </a:p>
@@ -9531,6 +9786,198 @@
     <p:extLst>
       <p:ext uri="{BB962C8B-B14F-4D97-AF65-F5344CB8AC3E}">
         <p14:creationId xmlns:p14="http://schemas.microsoft.com/office/powerpoint/2010/main" val="3176563619"/>
+      </p:ext>
+    </p:extLst>
+  </p:cSld>
+  <p:clrMapOvr>
+    <a:masterClrMapping/>
+  </p:clrMapOvr>
+</p:sld>
+</file>
+
+<file path=ppt/slides/slide28.xml><?xml version="1.0" encoding="utf-8"?>
+<p:sld xmlns:a="http://schemas.openxmlformats.org/drawingml/2006/main" xmlns:r="http://schemas.openxmlformats.org/officeDocument/2006/relationships" xmlns:p="http://schemas.openxmlformats.org/presentationml/2006/main">
+  <p:cSld>
+    <p:spTree>
+      <p:nvGrpSpPr>
+        <p:cNvPr id="1" name=""/>
+        <p:cNvGrpSpPr/>
+        <p:nvPr/>
+      </p:nvGrpSpPr>
+      <p:grpSpPr>
+        <a:xfrm>
+          <a:off x="0" y="0"/>
+          <a:ext cx="0" cy="0"/>
+          <a:chOff x="0" y="0"/>
+          <a:chExt cx="0" cy="0"/>
+        </a:xfrm>
+      </p:grpSpPr>
+      <p:sp>
+        <p:nvSpPr>
+          <p:cNvPr id="2" name="Unvan 1"/>
+          <p:cNvSpPr>
+            <a:spLocks noGrp="1"/>
+          </p:cNvSpPr>
+          <p:nvPr>
+            <p:ph type="title"/>
+          </p:nvPr>
+        </p:nvSpPr>
+        <p:spPr/>
+        <p:txBody>
+          <a:bodyPr>
+            <a:normAutofit fontScale="90000"/>
+          </a:bodyPr>
+          <a:lstStyle/>
+          <a:p>
+            <a:r>
+              <a:rPr lang="tr-TR" smtClean="0"/>
+              <a:t>Asimetrik Şifreleme </a:t>
+            </a:r>
+            <a:r>
+              <a:rPr lang="tr-TR"/>
+              <a:t>Algoritması</a:t>
+            </a:r>
+            <a:r>
+              <a:rPr lang="tr-TR" smtClean="0"/>
+              <a:t> (kriptografi)</a:t>
+            </a:r>
+            <a:endParaRPr lang="tr-TR"/>
+          </a:p>
+        </p:txBody>
+      </p:sp>
+      <p:sp>
+        <p:nvSpPr>
+          <p:cNvPr id="3" name="İçerik Yer Tutucusu 2"/>
+          <p:cNvSpPr>
+            <a:spLocks noGrp="1"/>
+          </p:cNvSpPr>
+          <p:nvPr>
+            <p:ph idx="1"/>
+          </p:nvPr>
+        </p:nvSpPr>
+        <p:spPr/>
+        <p:txBody>
+          <a:bodyPr/>
+          <a:lstStyle/>
+          <a:p>
+            <a:r>
+              <a:rPr lang="tr-TR"/>
+              <a:t>Asimetrik  </a:t>
+            </a:r>
+            <a:r>
+              <a:rPr lang="tr-TR" smtClean="0"/>
+              <a:t>Şifreleme Algoritması nedir ? </a:t>
+            </a:r>
+          </a:p>
+          <a:p>
+            <a:r>
+              <a:rPr lang="tr-TR"/>
+              <a:t>Asimetrik  </a:t>
+            </a:r>
+            <a:r>
+              <a:rPr lang="tr-TR"/>
+              <a:t>Şifreleme </a:t>
+            </a:r>
+            <a:r>
+              <a:rPr lang="tr-TR" smtClean="0"/>
+              <a:t>Algoritması avantajları? </a:t>
+            </a:r>
+          </a:p>
+          <a:p>
+            <a:r>
+              <a:rPr lang="tr-TR"/>
+              <a:t>Asimetrik  </a:t>
+            </a:r>
+            <a:r>
+              <a:rPr lang="tr-TR"/>
+              <a:t>Şifreleme Algoritması </a:t>
+            </a:r>
+            <a:r>
+              <a:rPr lang="tr-TR" smtClean="0"/>
+              <a:t>dezavantajları? </a:t>
+            </a:r>
+          </a:p>
+          <a:p>
+            <a:endParaRPr lang="tr-TR"/>
+          </a:p>
+          <a:p>
+            <a:endParaRPr lang="tr-TR" smtClean="0"/>
+          </a:p>
+        </p:txBody>
+      </p:sp>
+      <p:sp>
+        <p:nvSpPr>
+          <p:cNvPr id="4" name="Veri Yer Tutucusu 3"/>
+          <p:cNvSpPr>
+            <a:spLocks noGrp="1"/>
+          </p:cNvSpPr>
+          <p:nvPr>
+            <p:ph type="dt" sz="half" idx="10"/>
+          </p:nvPr>
+        </p:nvSpPr>
+        <p:spPr/>
+        <p:txBody>
+          <a:bodyPr/>
+          <a:lstStyle/>
+          <a:p>
+            <a:fld id="{AA833C2E-F721-4D16-A208-27426F60C2E0}" type="datetime1">
+              <a:rPr lang="tr-TR" smtClean="0"/>
+              <a:t>5.07.2021</a:t>
+            </a:fld>
+            <a:endParaRPr lang="tr-TR"/>
+          </a:p>
+        </p:txBody>
+      </p:sp>
+      <p:sp>
+        <p:nvSpPr>
+          <p:cNvPr id="5" name="Altbilgi Yer Tutucusu 4"/>
+          <p:cNvSpPr>
+            <a:spLocks noGrp="1"/>
+          </p:cNvSpPr>
+          <p:nvPr>
+            <p:ph type="ftr" sz="quarter" idx="11"/>
+          </p:nvPr>
+        </p:nvSpPr>
+        <p:spPr/>
+        <p:txBody>
+          <a:bodyPr/>
+          <a:lstStyle/>
+          <a:p>
+            <a:r>
+              <a:rPr lang="tr-TR" smtClean="0"/>
+              <a:t>JAVA FULL STACK DEVELOPER HAMİT MIZRAK</a:t>
+            </a:r>
+            <a:endParaRPr lang="tr-TR"/>
+          </a:p>
+        </p:txBody>
+      </p:sp>
+      <p:sp>
+        <p:nvSpPr>
+          <p:cNvPr id="6" name="Slayt Numarası Yer Tutucusu 5"/>
+          <p:cNvSpPr>
+            <a:spLocks noGrp="1"/>
+          </p:cNvSpPr>
+          <p:nvPr>
+            <p:ph type="sldNum" sz="quarter" idx="12"/>
+          </p:nvPr>
+        </p:nvSpPr>
+        <p:spPr/>
+        <p:txBody>
+          <a:bodyPr/>
+          <a:lstStyle/>
+          <a:p>
+            <a:fld id="{F580D79E-702A-4AF5-93EF-BBEB456BD2DD}" type="slidenum">
+              <a:rPr lang="tr-TR" smtClean="0"/>
+              <a:t>28</a:t>
+            </a:fld>
+            <a:endParaRPr lang="tr-TR"/>
+          </a:p>
+        </p:txBody>
+      </p:sp>
+    </p:spTree>
+    <p:extLst>
+      <p:ext uri="{BB962C8B-B14F-4D97-AF65-F5344CB8AC3E}">
+        <p14:creationId xmlns:p14="http://schemas.microsoft.com/office/powerpoint/2010/main" val="4229384378"/>
       </p:ext>
     </p:extLst>
   </p:cSld>
@@ -9818,7 +10265,15 @@
           <a:p>
             <a:r>
               <a:rPr lang="tr-TR" smtClean="0"/>
-              <a:t>visual Studuio code</a:t>
+              <a:t>visual </a:t>
+            </a:r>
+            <a:r>
+              <a:rPr lang="tr-TR" smtClean="0"/>
+              <a:t>Studio </a:t>
+            </a:r>
+            <a:r>
+              <a:rPr lang="tr-TR" smtClean="0"/>
+              <a:t>code</a:t>
             </a:r>
           </a:p>
           <a:p>
@@ -10148,7 +10603,19 @@
             </a:r>
             <a:r>
               <a:rPr lang="tr-TR"/>
-              <a:t>için trigger yazılacak</a:t>
+              <a:t>için </a:t>
+            </a:r>
+            <a:r>
+              <a:rPr lang="tr-TR">
+                <a:solidFill>
+                  <a:srgbClr val="FFFF00"/>
+                </a:solidFill>
+              </a:rPr>
+              <a:t>trigger</a:t>
+            </a:r>
+            <a:r>
+              <a:rPr lang="tr-TR"/>
+              <a:t> yazılacak</a:t>
             </a:r>
           </a:p>
           <a:p>
@@ -10158,7 +10625,19 @@
             </a:r>
             <a:r>
               <a:rPr lang="tr-TR"/>
-              <a:t>işlem için database transaction ile </a:t>
+              <a:t>işlem için database </a:t>
+            </a:r>
+            <a:r>
+              <a:rPr lang="tr-TR">
+                <a:solidFill>
+                  <a:srgbClr val="FFFF00"/>
+                </a:solidFill>
+              </a:rPr>
+              <a:t>transaction</a:t>
+            </a:r>
+            <a:r>
+              <a:rPr lang="tr-TR"/>
+              <a:t> ile </a:t>
             </a:r>
             <a:r>
               <a:rPr lang="tr-TR" smtClean="0"/>
@@ -10167,14 +10646,34 @@
           </a:p>
           <a:p>
             <a:r>
-              <a:rPr lang="tr-TR" smtClean="0"/>
-              <a:t>View yapıalırı kullanılacak</a:t>
-            </a:r>
-          </a:p>
-          <a:p>
-            <a:r>
-              <a:rPr lang="tr-TR" smtClean="0"/>
-              <a:t>Gerekirse stored procedure kullanılacak.</a:t>
+              <a:rPr lang="tr-TR" smtClean="0">
+                <a:solidFill>
+                  <a:srgbClr val="FFFF00"/>
+                </a:solidFill>
+              </a:rPr>
+              <a:t>View</a:t>
+            </a:r>
+            <a:r>
+              <a:rPr lang="tr-TR" smtClean="0"/>
+              <a:t> yapıalırı kullanılacak</a:t>
+            </a:r>
+          </a:p>
+          <a:p>
+            <a:r>
+              <a:rPr lang="tr-TR" smtClean="0"/>
+              <a:t>Gerekirse </a:t>
+            </a:r>
+            <a:r>
+              <a:rPr lang="tr-TR" smtClean="0">
+                <a:solidFill>
+                  <a:srgbClr val="FFFF00"/>
+                </a:solidFill>
+              </a:rPr>
+              <a:t>stored procedure </a:t>
+            </a:r>
+            <a:r>
+              <a:rPr lang="tr-TR" smtClean="0"/>
+              <a:t>kullanılacak.</a:t>
             </a:r>
           </a:p>
           <a:p>

</xml_diff>